<commit_message>
cleaning up code and commenting
</commit_message>
<xml_diff>
--- a/docs/portfolio.pptx
+++ b/docs/portfolio.pptx
@@ -9,15 +9,17 @@
     <p:sldId id="262" r:id="rId3"/>
     <p:sldId id="263" r:id="rId4"/>
     <p:sldId id="264" r:id="rId5"/>
-    <p:sldId id="266" r:id="rId6"/>
-    <p:sldId id="267" r:id="rId7"/>
-    <p:sldId id="269" r:id="rId8"/>
-    <p:sldId id="257" r:id="rId9"/>
-    <p:sldId id="258" r:id="rId10"/>
-    <p:sldId id="259" r:id="rId11"/>
-    <p:sldId id="260" r:id="rId12"/>
-    <p:sldId id="268" r:id="rId13"/>
-    <p:sldId id="261" r:id="rId14"/>
+    <p:sldId id="270" r:id="rId6"/>
+    <p:sldId id="266" r:id="rId7"/>
+    <p:sldId id="267" r:id="rId8"/>
+    <p:sldId id="271" r:id="rId9"/>
+    <p:sldId id="269" r:id="rId10"/>
+    <p:sldId id="257" r:id="rId11"/>
+    <p:sldId id="258" r:id="rId12"/>
+    <p:sldId id="261" r:id="rId13"/>
+    <p:sldId id="259" r:id="rId14"/>
+    <p:sldId id="260" r:id="rId15"/>
+    <p:sldId id="268" r:id="rId16"/>
   </p:sldIdLst>
   <p:sldSz cx="12192000" cy="6858000"/>
   <p:notesSz cx="6858000" cy="9144000"/>
@@ -4091,7 +4093,7 @@
           <p:cNvPr id="2" name="Title 1">
             <a:extLst>
               <a:ext uri="{FF2B5EF4-FFF2-40B4-BE49-F238E27FC236}">
-                <a16:creationId xmlns:a16="http://schemas.microsoft.com/office/drawing/2014/main" id="{1354D4EC-EC09-C342-A8B1-D9BF7AD0D272}"/>
+                <a16:creationId xmlns:a16="http://schemas.microsoft.com/office/drawing/2014/main" id="{44657CCC-1AFB-8D49-BF0C-6180BD6D3C5A}"/>
               </a:ext>
             </a:extLst>
           </p:cNvPr>
@@ -4102,24 +4104,29 @@
             <p:ph type="title"/>
           </p:nvPr>
         </p:nvSpPr>
-        <p:spPr/>
+        <p:spPr>
+          <a:xfrm>
+            <a:off x="1097280" y="286603"/>
+            <a:ext cx="10058400" cy="1450757"/>
+          </a:xfrm>
+        </p:spPr>
         <p:txBody>
           <a:bodyPr/>
           <a:lstStyle/>
           <a:p>
             <a:r>
               <a:rPr lang="en-US" dirty="0"/>
-              <a:t>about</a:t>
+              <a:t>home</a:t>
             </a:r>
           </a:p>
         </p:txBody>
       </p:sp>
       <p:pic>
         <p:nvPicPr>
-          <p:cNvPr id="5" name="Content Placeholder 4" descr="A screenshot of a social media post&#10;&#10;Description automatically generated">
-            <a:extLst>
-              <a:ext uri="{FF2B5EF4-FFF2-40B4-BE49-F238E27FC236}">
-                <a16:creationId xmlns:a16="http://schemas.microsoft.com/office/drawing/2014/main" id="{F6D0174D-69AA-9140-A114-842FA535C592}"/>
+          <p:cNvPr id="5" name="Content Placeholder 4" descr="A picture containing outdoor, mountain, water, white&#10;&#10;Description automatically generated">
+            <a:extLst>
+              <a:ext uri="{FF2B5EF4-FFF2-40B4-BE49-F238E27FC236}">
+                <a16:creationId xmlns:a16="http://schemas.microsoft.com/office/drawing/2014/main" id="{06C50B92-5E3B-C942-83E3-89CEED2E3141}"/>
               </a:ext>
             </a:extLst>
           </p:cNvPr>
@@ -4146,7 +4153,7 @@
     </p:spTree>
     <p:extLst>
       <p:ext uri="{BB962C8B-B14F-4D97-AF65-F5344CB8AC3E}">
-        <p14:creationId xmlns:p14="http://schemas.microsoft.com/office/powerpoint/2010/main" val="1000427732"/>
+        <p14:creationId xmlns:p14="http://schemas.microsoft.com/office/powerpoint/2010/main" val="3845786955"/>
       </p:ext>
     </p:extLst>
   </p:cSld>
@@ -4178,7 +4185,7 @@
           <p:cNvPr id="2" name="Title 1">
             <a:extLst>
               <a:ext uri="{FF2B5EF4-FFF2-40B4-BE49-F238E27FC236}">
-                <a16:creationId xmlns:a16="http://schemas.microsoft.com/office/drawing/2014/main" id="{93CAA760-645F-F24A-9062-2372209BC32B}"/>
+                <a16:creationId xmlns:a16="http://schemas.microsoft.com/office/drawing/2014/main" id="{950E2EC4-C3AE-6948-A55D-39B416759492}"/>
               </a:ext>
             </a:extLst>
           </p:cNvPr>
@@ -4189,24 +4196,30 @@
             <p:ph type="title"/>
           </p:nvPr>
         </p:nvSpPr>
-        <p:spPr/>
+        <p:spPr>
+          <a:xfrm>
+            <a:off x="1097280" y="286603"/>
+            <a:ext cx="10058400" cy="1450757"/>
+          </a:xfrm>
+        </p:spPr>
         <p:txBody>
           <a:bodyPr/>
           <a:lstStyle/>
           <a:p>
             <a:r>
-              <a:rPr lang="en-US" dirty="0"/>
-              <a:t>contact</a:t>
-            </a:r>
+              <a:rPr lang="en-US"/>
+              <a:t>blog</a:t>
+            </a:r>
+            <a:endParaRPr lang="en-US" dirty="0"/>
           </a:p>
         </p:txBody>
       </p:sp>
       <p:pic>
         <p:nvPicPr>
-          <p:cNvPr id="5" name="Content Placeholder 4" descr="A screenshot of a social media post&#10;&#10;Description automatically generated">
-            <a:extLst>
-              <a:ext uri="{FF2B5EF4-FFF2-40B4-BE49-F238E27FC236}">
-                <a16:creationId xmlns:a16="http://schemas.microsoft.com/office/drawing/2014/main" id="{878DBFF1-A860-9840-A1B0-58AC742C7AB2}"/>
+          <p:cNvPr id="5" name="Content Placeholder 4" descr="A screenshot of a cell phone&#10;&#10;Description automatically generated">
+            <a:extLst>
+              <a:ext uri="{FF2B5EF4-FFF2-40B4-BE49-F238E27FC236}">
+                <a16:creationId xmlns:a16="http://schemas.microsoft.com/office/drawing/2014/main" id="{75DF87F3-6BB1-5344-B0C3-643D6E374275}"/>
               </a:ext>
             </a:extLst>
           </p:cNvPr>
@@ -4233,7 +4246,7 @@
     </p:spTree>
     <p:extLst>
       <p:ext uri="{BB962C8B-B14F-4D97-AF65-F5344CB8AC3E}">
-        <p14:creationId xmlns:p14="http://schemas.microsoft.com/office/powerpoint/2010/main" val="2324269453"/>
+        <p14:creationId xmlns:p14="http://schemas.microsoft.com/office/powerpoint/2010/main" val="123422405"/>
       </p:ext>
     </p:extLst>
   </p:cSld>
@@ -4246,14 +4259,6 @@
 <file path=ppt/slides/slide12.xml><?xml version="1.0" encoding="utf-8"?>
 <p:sld xmlns:a="http://schemas.openxmlformats.org/drawingml/2006/main" xmlns:r="http://schemas.openxmlformats.org/officeDocument/2006/relationships" xmlns:p="http://schemas.openxmlformats.org/presentationml/2006/main">
   <p:cSld>
-    <p:bg>
-      <p:bgPr>
-        <a:solidFill>
-          <a:schemeClr val="bg1"/>
-        </a:solidFill>
-        <a:effectLst/>
-      </p:bgPr>
-    </p:bg>
     <p:spTree>
       <p:nvGrpSpPr>
         <p:cNvPr id="1" name=""/>
@@ -4270,65 +4275,38 @@
       </p:grpSpPr>
       <p:sp>
         <p:nvSpPr>
-          <p:cNvPr id="17" name="Rectangle 16">
-            <a:extLst>
-              <a:ext uri="{FF2B5EF4-FFF2-40B4-BE49-F238E27FC236}">
-                <a16:creationId xmlns:a16="http://schemas.microsoft.com/office/drawing/2014/main" id="{A8E9C91B-7EAD-4562-AB0E-DFB9663AECE3}"/>
-              </a:ext>
-              <a:ext uri="{C183D7F6-B498-43B3-948B-1728B52AA6E4}">
-                <adec:decorative xmlns:adec="http://schemas.microsoft.com/office/drawing/2017/decorative" val="1"/>
-              </a:ext>
-            </a:extLst>
-          </p:cNvPr>
-          <p:cNvSpPr>
-            <a:spLocks noGrp="1" noRot="1" noChangeAspect="1" noMove="1" noResize="1" noEditPoints="1" noAdjustHandles="1" noChangeArrowheads="1" noChangeShapeType="1" noTextEdit="1"/>
-          </p:cNvSpPr>
-          <p:nvPr>
-            <p:extLst>
-              <p:ext uri="{386F3935-93C4-4BCD-93E2-E3B085C9AB24}">
-                <p16:designElem xmlns:p16="http://schemas.microsoft.com/office/powerpoint/2015/main" val="1"/>
-              </p:ext>
-            </p:extLst>
-          </p:nvPr>
-        </p:nvSpPr>
-        <p:spPr>
-          <a:xfrm>
-            <a:off x="3175" y="6400800"/>
-            <a:ext cx="12188825" cy="457200"/>
-          </a:xfrm>
-          <a:prstGeom prst="rect">
-            <a:avLst/>
-          </a:prstGeom>
-          <a:solidFill>
-            <a:srgbClr val="262626"/>
-          </a:solidFill>
-          <a:ln>
-            <a:noFill/>
-          </a:ln>
-        </p:spPr>
-        <p:style>
-          <a:lnRef idx="2">
-            <a:schemeClr val="accent1">
-              <a:shade val="50000"/>
-            </a:schemeClr>
-          </a:lnRef>
-          <a:fillRef idx="1">
-            <a:schemeClr val="accent1"/>
-          </a:fillRef>
-          <a:effectRef idx="0">
-            <a:schemeClr val="accent1"/>
-          </a:effectRef>
-          <a:fontRef idx="minor">
-            <a:schemeClr val="lt1"/>
-          </a:fontRef>
-        </p:style>
+          <p:cNvPr id="2" name="Title 1">
+            <a:extLst>
+              <a:ext uri="{FF2B5EF4-FFF2-40B4-BE49-F238E27FC236}">
+                <a16:creationId xmlns:a16="http://schemas.microsoft.com/office/drawing/2014/main" id="{F3092268-7A1C-0C47-AEEA-0C276899A6E9}"/>
+              </a:ext>
+            </a:extLst>
+          </p:cNvPr>
+          <p:cNvSpPr>
+            <a:spLocks noGrp="1"/>
+          </p:cNvSpPr>
+          <p:nvPr>
+            <p:ph type="title"/>
+          </p:nvPr>
+        </p:nvSpPr>
+        <p:spPr/>
+        <p:txBody>
+          <a:bodyPr/>
+          <a:lstStyle/>
+          <a:p>
+            <a:r>
+              <a:rPr lang="en-US" dirty="0"/>
+              <a:t>blog entry</a:t>
+            </a:r>
+          </a:p>
+        </p:txBody>
       </p:sp>
       <p:pic>
         <p:nvPicPr>
-          <p:cNvPr id="5" name="Content Placeholder 4" descr="A cat that is looking at the camera&#10;&#10;Description automatically generated">
-            <a:extLst>
-              <a:ext uri="{FF2B5EF4-FFF2-40B4-BE49-F238E27FC236}">
-                <a16:creationId xmlns:a16="http://schemas.microsoft.com/office/drawing/2014/main" id="{B73A0A8B-4DA3-E744-B7EC-10110BA486E2}"/>
+          <p:cNvPr id="5" name="Content Placeholder 4" descr="A screenshot of a cat&#10;&#10;Description automatically generated">
+            <a:extLst>
+              <a:ext uri="{FF2B5EF4-FFF2-40B4-BE49-F238E27FC236}">
+                <a16:creationId xmlns:a16="http://schemas.microsoft.com/office/drawing/2014/main" id="{A8BA235E-A5CC-2040-9CC4-B24B86CF68A5}"/>
               </a:ext>
             </a:extLst>
           </p:cNvPr>
@@ -4339,25 +4317,23 @@
             <p:ph idx="1"/>
           </p:nvPr>
         </p:nvPicPr>
-        <p:blipFill rotWithShape="1">
+        <p:blipFill>
           <a:blip r:embed="rId2"/>
-          <a:srcRect t="8148" b="7583"/>
-          <a:stretch/>
+          <a:stretch>
+            <a:fillRect/>
+          </a:stretch>
         </p:blipFill>
         <p:spPr>
           <a:xfrm>
-            <a:off x="20" y="10"/>
-            <a:ext cx="12191980" cy="6857990"/>
-          </a:xfrm>
-          <a:prstGeom prst="rect">
-            <a:avLst/>
-          </a:prstGeom>
+            <a:off x="3117533" y="2108200"/>
+            <a:ext cx="6017260" cy="3760788"/>
+          </a:xfrm>
         </p:spPr>
       </p:pic>
     </p:spTree>
     <p:extLst>
       <p:ext uri="{BB962C8B-B14F-4D97-AF65-F5344CB8AC3E}">
-        <p14:creationId xmlns:p14="http://schemas.microsoft.com/office/powerpoint/2010/main" val="549081930"/>
+        <p14:creationId xmlns:p14="http://schemas.microsoft.com/office/powerpoint/2010/main" val="258487204"/>
       </p:ext>
     </p:extLst>
   </p:cSld>
@@ -4389,7 +4365,7 @@
           <p:cNvPr id="2" name="Title 1">
             <a:extLst>
               <a:ext uri="{FF2B5EF4-FFF2-40B4-BE49-F238E27FC236}">
-                <a16:creationId xmlns:a16="http://schemas.microsoft.com/office/drawing/2014/main" id="{F3092268-7A1C-0C47-AEEA-0C276899A6E9}"/>
+                <a16:creationId xmlns:a16="http://schemas.microsoft.com/office/drawing/2014/main" id="{1354D4EC-EC09-C342-A8B1-D9BF7AD0D272}"/>
               </a:ext>
             </a:extLst>
           </p:cNvPr>
@@ -4407,17 +4383,17 @@
           <a:p>
             <a:r>
               <a:rPr lang="en-US" dirty="0"/>
-              <a:t>blog entry</a:t>
+              <a:t>about</a:t>
             </a:r>
           </a:p>
         </p:txBody>
       </p:sp>
       <p:pic>
         <p:nvPicPr>
-          <p:cNvPr id="5" name="Content Placeholder 4" descr="A screenshot of a cat&#10;&#10;Description automatically generated">
-            <a:extLst>
-              <a:ext uri="{FF2B5EF4-FFF2-40B4-BE49-F238E27FC236}">
-                <a16:creationId xmlns:a16="http://schemas.microsoft.com/office/drawing/2014/main" id="{A8BA235E-A5CC-2040-9CC4-B24B86CF68A5}"/>
+          <p:cNvPr id="5" name="Content Placeholder 4" descr="A screenshot of a social media post&#10;&#10;Description automatically generated">
+            <a:extLst>
+              <a:ext uri="{FF2B5EF4-FFF2-40B4-BE49-F238E27FC236}">
+                <a16:creationId xmlns:a16="http://schemas.microsoft.com/office/drawing/2014/main" id="{F6D0174D-69AA-9140-A114-842FA535C592}"/>
               </a:ext>
             </a:extLst>
           </p:cNvPr>
@@ -4444,7 +4420,218 @@
     </p:spTree>
     <p:extLst>
       <p:ext uri="{BB962C8B-B14F-4D97-AF65-F5344CB8AC3E}">
-        <p14:creationId xmlns:p14="http://schemas.microsoft.com/office/powerpoint/2010/main" val="258487204"/>
+        <p14:creationId xmlns:p14="http://schemas.microsoft.com/office/powerpoint/2010/main" val="1000427732"/>
+      </p:ext>
+    </p:extLst>
+  </p:cSld>
+  <p:clrMapOvr>
+    <a:masterClrMapping/>
+  </p:clrMapOvr>
+</p:sld>
+</file>
+
+<file path=ppt/slides/slide14.xml><?xml version="1.0" encoding="utf-8"?>
+<p:sld xmlns:a="http://schemas.openxmlformats.org/drawingml/2006/main" xmlns:r="http://schemas.openxmlformats.org/officeDocument/2006/relationships" xmlns:p="http://schemas.openxmlformats.org/presentationml/2006/main">
+  <p:cSld>
+    <p:spTree>
+      <p:nvGrpSpPr>
+        <p:cNvPr id="1" name=""/>
+        <p:cNvGrpSpPr/>
+        <p:nvPr/>
+      </p:nvGrpSpPr>
+      <p:grpSpPr>
+        <a:xfrm>
+          <a:off x="0" y="0"/>
+          <a:ext cx="0" cy="0"/>
+          <a:chOff x="0" y="0"/>
+          <a:chExt cx="0" cy="0"/>
+        </a:xfrm>
+      </p:grpSpPr>
+      <p:sp>
+        <p:nvSpPr>
+          <p:cNvPr id="2" name="Title 1">
+            <a:extLst>
+              <a:ext uri="{FF2B5EF4-FFF2-40B4-BE49-F238E27FC236}">
+                <a16:creationId xmlns:a16="http://schemas.microsoft.com/office/drawing/2014/main" id="{93CAA760-645F-F24A-9062-2372209BC32B}"/>
+              </a:ext>
+            </a:extLst>
+          </p:cNvPr>
+          <p:cNvSpPr>
+            <a:spLocks noGrp="1"/>
+          </p:cNvSpPr>
+          <p:nvPr>
+            <p:ph type="title"/>
+          </p:nvPr>
+        </p:nvSpPr>
+        <p:spPr/>
+        <p:txBody>
+          <a:bodyPr/>
+          <a:lstStyle/>
+          <a:p>
+            <a:r>
+              <a:rPr lang="en-US" dirty="0"/>
+              <a:t>contact</a:t>
+            </a:r>
+          </a:p>
+        </p:txBody>
+      </p:sp>
+      <p:pic>
+        <p:nvPicPr>
+          <p:cNvPr id="5" name="Content Placeholder 4" descr="A screenshot of a social media post&#10;&#10;Description automatically generated">
+            <a:extLst>
+              <a:ext uri="{FF2B5EF4-FFF2-40B4-BE49-F238E27FC236}">
+                <a16:creationId xmlns:a16="http://schemas.microsoft.com/office/drawing/2014/main" id="{878DBFF1-A860-9840-A1B0-58AC742C7AB2}"/>
+              </a:ext>
+            </a:extLst>
+          </p:cNvPr>
+          <p:cNvPicPr>
+            <a:picLocks noGrp="1" noChangeAspect="1"/>
+          </p:cNvPicPr>
+          <p:nvPr>
+            <p:ph idx="1"/>
+          </p:nvPr>
+        </p:nvPicPr>
+        <p:blipFill>
+          <a:blip r:embed="rId2"/>
+          <a:stretch>
+            <a:fillRect/>
+          </a:stretch>
+        </p:blipFill>
+        <p:spPr>
+          <a:xfrm>
+            <a:off x="3117533" y="2108200"/>
+            <a:ext cx="6017260" cy="3760788"/>
+          </a:xfrm>
+        </p:spPr>
+      </p:pic>
+    </p:spTree>
+    <p:extLst>
+      <p:ext uri="{BB962C8B-B14F-4D97-AF65-F5344CB8AC3E}">
+        <p14:creationId xmlns:p14="http://schemas.microsoft.com/office/powerpoint/2010/main" val="2324269453"/>
+      </p:ext>
+    </p:extLst>
+  </p:cSld>
+  <p:clrMapOvr>
+    <a:masterClrMapping/>
+  </p:clrMapOvr>
+</p:sld>
+</file>
+
+<file path=ppt/slides/slide15.xml><?xml version="1.0" encoding="utf-8"?>
+<p:sld xmlns:a="http://schemas.openxmlformats.org/drawingml/2006/main" xmlns:r="http://schemas.openxmlformats.org/officeDocument/2006/relationships" xmlns:p="http://schemas.openxmlformats.org/presentationml/2006/main">
+  <p:cSld>
+    <p:bg>
+      <p:bgPr>
+        <a:solidFill>
+          <a:schemeClr val="bg1"/>
+        </a:solidFill>
+        <a:effectLst/>
+      </p:bgPr>
+    </p:bg>
+    <p:spTree>
+      <p:nvGrpSpPr>
+        <p:cNvPr id="1" name=""/>
+        <p:cNvGrpSpPr/>
+        <p:nvPr/>
+      </p:nvGrpSpPr>
+      <p:grpSpPr>
+        <a:xfrm>
+          <a:off x="0" y="0"/>
+          <a:ext cx="0" cy="0"/>
+          <a:chOff x="0" y="0"/>
+          <a:chExt cx="0" cy="0"/>
+        </a:xfrm>
+      </p:grpSpPr>
+      <p:sp>
+        <p:nvSpPr>
+          <p:cNvPr id="17" name="Rectangle 16">
+            <a:extLst>
+              <a:ext uri="{FF2B5EF4-FFF2-40B4-BE49-F238E27FC236}">
+                <a16:creationId xmlns:a16="http://schemas.microsoft.com/office/drawing/2014/main" id="{A8E9C91B-7EAD-4562-AB0E-DFB9663AECE3}"/>
+              </a:ext>
+              <a:ext uri="{C183D7F6-B498-43B3-948B-1728B52AA6E4}">
+                <adec:decorative xmlns:adec="http://schemas.microsoft.com/office/drawing/2017/decorative" val="1"/>
+              </a:ext>
+            </a:extLst>
+          </p:cNvPr>
+          <p:cNvSpPr>
+            <a:spLocks noGrp="1" noRot="1" noChangeAspect="1" noMove="1" noResize="1" noEditPoints="1" noAdjustHandles="1" noChangeArrowheads="1" noChangeShapeType="1" noTextEdit="1"/>
+          </p:cNvSpPr>
+          <p:nvPr>
+            <p:extLst>
+              <p:ext uri="{386F3935-93C4-4BCD-93E2-E3B085C9AB24}">
+                <p16:designElem xmlns:p16="http://schemas.microsoft.com/office/powerpoint/2015/main" val="1"/>
+              </p:ext>
+            </p:extLst>
+          </p:nvPr>
+        </p:nvSpPr>
+        <p:spPr>
+          <a:xfrm>
+            <a:off x="3175" y="6400800"/>
+            <a:ext cx="12188825" cy="457200"/>
+          </a:xfrm>
+          <a:prstGeom prst="rect">
+            <a:avLst/>
+          </a:prstGeom>
+          <a:solidFill>
+            <a:srgbClr val="262626"/>
+          </a:solidFill>
+          <a:ln>
+            <a:noFill/>
+          </a:ln>
+        </p:spPr>
+        <p:style>
+          <a:lnRef idx="2">
+            <a:schemeClr val="accent1">
+              <a:shade val="50000"/>
+            </a:schemeClr>
+          </a:lnRef>
+          <a:fillRef idx="1">
+            <a:schemeClr val="accent1"/>
+          </a:fillRef>
+          <a:effectRef idx="0">
+            <a:schemeClr val="accent1"/>
+          </a:effectRef>
+          <a:fontRef idx="minor">
+            <a:schemeClr val="lt1"/>
+          </a:fontRef>
+        </p:style>
+      </p:sp>
+      <p:pic>
+        <p:nvPicPr>
+          <p:cNvPr id="5" name="Content Placeholder 4" descr="A cat that is looking at the camera&#10;&#10;Description automatically generated">
+            <a:extLst>
+              <a:ext uri="{FF2B5EF4-FFF2-40B4-BE49-F238E27FC236}">
+                <a16:creationId xmlns:a16="http://schemas.microsoft.com/office/drawing/2014/main" id="{B73A0A8B-4DA3-E744-B7EC-10110BA486E2}"/>
+              </a:ext>
+            </a:extLst>
+          </p:cNvPr>
+          <p:cNvPicPr>
+            <a:picLocks noGrp="1" noChangeAspect="1"/>
+          </p:cNvPicPr>
+          <p:nvPr>
+            <p:ph idx="1"/>
+          </p:nvPr>
+        </p:nvPicPr>
+        <p:blipFill rotWithShape="1">
+          <a:blip r:embed="rId2"/>
+          <a:srcRect t="8148" b="7583"/>
+          <a:stretch/>
+        </p:blipFill>
+        <p:spPr>
+          <a:xfrm>
+            <a:off x="20" y="10"/>
+            <a:ext cx="12191980" cy="6857990"/>
+          </a:xfrm>
+          <a:prstGeom prst="rect">
+            <a:avLst/>
+          </a:prstGeom>
+        </p:spPr>
+      </p:pic>
+    </p:spTree>
+    <p:extLst>
+      <p:ext uri="{BB962C8B-B14F-4D97-AF65-F5344CB8AC3E}">
+        <p14:creationId xmlns:p14="http://schemas.microsoft.com/office/powerpoint/2010/main" val="549081930"/>
       </p:ext>
     </p:extLst>
   </p:cSld>
@@ -5648,6 +5835,93 @@
 <file path=ppt/slides/slide5.xml><?xml version="1.0" encoding="utf-8"?>
 <p:sld xmlns:a="http://schemas.openxmlformats.org/drawingml/2006/main" xmlns:r="http://schemas.openxmlformats.org/officeDocument/2006/relationships" xmlns:p="http://schemas.openxmlformats.org/presentationml/2006/main">
   <p:cSld>
+    <p:spTree>
+      <p:nvGrpSpPr>
+        <p:cNvPr id="1" name=""/>
+        <p:cNvGrpSpPr/>
+        <p:nvPr/>
+      </p:nvGrpSpPr>
+      <p:grpSpPr>
+        <a:xfrm>
+          <a:off x="0" y="0"/>
+          <a:ext cx="0" cy="0"/>
+          <a:chOff x="0" y="0"/>
+          <a:chExt cx="0" cy="0"/>
+        </a:xfrm>
+      </p:grpSpPr>
+      <p:sp>
+        <p:nvSpPr>
+          <p:cNvPr id="2" name="Title 1">
+            <a:extLst>
+              <a:ext uri="{FF2B5EF4-FFF2-40B4-BE49-F238E27FC236}">
+                <a16:creationId xmlns:a16="http://schemas.microsoft.com/office/drawing/2014/main" id="{4842F77B-BA3E-1F49-9CC7-54184F6870B2}"/>
+              </a:ext>
+            </a:extLst>
+          </p:cNvPr>
+          <p:cNvSpPr>
+            <a:spLocks noGrp="1"/>
+          </p:cNvSpPr>
+          <p:nvPr>
+            <p:ph type="title"/>
+          </p:nvPr>
+        </p:nvSpPr>
+        <p:spPr/>
+        <p:txBody>
+          <a:bodyPr/>
+          <a:lstStyle/>
+          <a:p>
+            <a:r>
+              <a:rPr lang="en-US" dirty="0"/>
+              <a:t>sitemap</a:t>
+            </a:r>
+          </a:p>
+        </p:txBody>
+      </p:sp>
+      <p:pic>
+        <p:nvPicPr>
+          <p:cNvPr id="5" name="Content Placeholder 4" descr="A close up of a sign&#10;&#10;Description automatically generated">
+            <a:extLst>
+              <a:ext uri="{FF2B5EF4-FFF2-40B4-BE49-F238E27FC236}">
+                <a16:creationId xmlns:a16="http://schemas.microsoft.com/office/drawing/2014/main" id="{83DE453E-0BB0-B942-ACAA-7A5F0F14B36A}"/>
+              </a:ext>
+            </a:extLst>
+          </p:cNvPr>
+          <p:cNvPicPr>
+            <a:picLocks noGrp="1" noChangeAspect="1"/>
+          </p:cNvPicPr>
+          <p:nvPr>
+            <p:ph idx="1"/>
+          </p:nvPr>
+        </p:nvPicPr>
+        <p:blipFill>
+          <a:blip r:embed="rId2"/>
+          <a:stretch>
+            <a:fillRect/>
+          </a:stretch>
+        </p:blipFill>
+        <p:spPr>
+          <a:xfrm>
+            <a:off x="2518668" y="2108200"/>
+            <a:ext cx="7214990" cy="3760788"/>
+          </a:xfrm>
+        </p:spPr>
+      </p:pic>
+    </p:spTree>
+    <p:extLst>
+      <p:ext uri="{BB962C8B-B14F-4D97-AF65-F5344CB8AC3E}">
+        <p14:creationId xmlns:p14="http://schemas.microsoft.com/office/powerpoint/2010/main" val="3323506445"/>
+      </p:ext>
+    </p:extLst>
+  </p:cSld>
+  <p:clrMapOvr>
+    <a:masterClrMapping/>
+  </p:clrMapOvr>
+</p:sld>
+</file>
+
+<file path=ppt/slides/slide6.xml><?xml version="1.0" encoding="utf-8"?>
+<p:sld xmlns:a="http://schemas.openxmlformats.org/drawingml/2006/main" xmlns:r="http://schemas.openxmlformats.org/officeDocument/2006/relationships" xmlns:p="http://schemas.openxmlformats.org/presentationml/2006/main">
+  <p:cSld>
     <p:bg>
       <p:bgPr>
         <a:solidFill>
@@ -5930,12 +6204,12 @@
               </a:spcAft>
             </a:pPr>
             <a:r>
-              <a:rPr lang="en-US" sz="5400">
+              <a:rPr lang="en-US" sz="5400" dirty="0">
                 <a:solidFill>
                   <a:schemeClr val="tx1"/>
                 </a:solidFill>
               </a:rPr>
-              <a:t>What will be used?</a:t>
+              <a:t>What did I use?</a:t>
             </a:r>
           </a:p>
         </p:txBody>
@@ -6064,7 +6338,7 @@
 </p:sld>
 </file>
 
-<file path=ppt/slides/slide6.xml><?xml version="1.0" encoding="utf-8"?>
+<file path=ppt/slides/slide7.xml><?xml version="1.0" encoding="utf-8"?>
 <p:sld xmlns:a="http://schemas.openxmlformats.org/drawingml/2006/main" xmlns:r="http://schemas.openxmlformats.org/officeDocument/2006/relationships" xmlns:p="http://schemas.openxmlformats.org/presentationml/2006/main">
   <p:cSld>
     <p:spTree>
@@ -6104,7 +6378,7 @@
           <a:p>
             <a:r>
               <a:rPr lang="en-US" dirty="0"/>
-              <a:t>What will be used?</a:t>
+              <a:t>What did I use?</a:t>
             </a:r>
           </a:p>
         </p:txBody>
@@ -6138,7 +6412,7 @@
           <a:p>
             <a:r>
               <a:rPr lang="en-US" dirty="0"/>
-              <a:t>- CSS</a:t>
+              <a:t>- SCSS</a:t>
             </a:r>
           </a:p>
           <a:p>
@@ -6189,7 +6463,118 @@
 </p:sld>
 </file>
 
-<file path=ppt/slides/slide7.xml><?xml version="1.0" encoding="utf-8"?>
+<file path=ppt/slides/slide8.xml><?xml version="1.0" encoding="utf-8"?>
+<p:sld xmlns:a="http://schemas.openxmlformats.org/drawingml/2006/main" xmlns:r="http://schemas.openxmlformats.org/officeDocument/2006/relationships" xmlns:p="http://schemas.openxmlformats.org/presentationml/2006/main">
+  <p:cSld>
+    <p:spTree>
+      <p:nvGrpSpPr>
+        <p:cNvPr id="1" name=""/>
+        <p:cNvGrpSpPr/>
+        <p:nvPr/>
+      </p:nvGrpSpPr>
+      <p:grpSpPr>
+        <a:xfrm>
+          <a:off x="0" y="0"/>
+          <a:ext cx="0" cy="0"/>
+          <a:chOff x="0" y="0"/>
+          <a:chExt cx="0" cy="0"/>
+        </a:xfrm>
+      </p:grpSpPr>
+      <p:sp>
+        <p:nvSpPr>
+          <p:cNvPr id="2" name="Title 1">
+            <a:extLst>
+              <a:ext uri="{FF2B5EF4-FFF2-40B4-BE49-F238E27FC236}">
+                <a16:creationId xmlns:a16="http://schemas.microsoft.com/office/drawing/2014/main" id="{AE16A645-E175-5D4C-A7E8-C4D2381F63A6}"/>
+              </a:ext>
+            </a:extLst>
+          </p:cNvPr>
+          <p:cNvSpPr>
+            <a:spLocks noGrp="1"/>
+          </p:cNvSpPr>
+          <p:nvPr>
+            <p:ph type="title"/>
+          </p:nvPr>
+        </p:nvSpPr>
+        <p:spPr/>
+        <p:txBody>
+          <a:bodyPr/>
+          <a:lstStyle/>
+          <a:p>
+            <a:r>
+              <a:rPr lang="en-US" dirty="0"/>
+              <a:t>What did I learn</a:t>
+            </a:r>
+          </a:p>
+        </p:txBody>
+      </p:sp>
+      <p:sp>
+        <p:nvSpPr>
+          <p:cNvPr id="3" name="Content Placeholder 2">
+            <a:extLst>
+              <a:ext uri="{FF2B5EF4-FFF2-40B4-BE49-F238E27FC236}">
+                <a16:creationId xmlns:a16="http://schemas.microsoft.com/office/drawing/2014/main" id="{0638F0B7-EF9C-7240-A206-3CDD405502CA}"/>
+              </a:ext>
+            </a:extLst>
+          </p:cNvPr>
+          <p:cNvSpPr>
+            <a:spLocks noGrp="1"/>
+          </p:cNvSpPr>
+          <p:nvPr>
+            <p:ph idx="1"/>
+          </p:nvPr>
+        </p:nvSpPr>
+        <p:spPr/>
+        <p:txBody>
+          <a:bodyPr/>
+          <a:lstStyle/>
+          <a:p>
+            <a:r>
+              <a:rPr lang="en-US" dirty="0"/>
+              <a:t>- You can do it!</a:t>
+            </a:r>
+          </a:p>
+          <a:p>
+            <a:r>
+              <a:rPr lang="en-US" dirty="0"/>
+              <a:t>- Nothing too serious</a:t>
+            </a:r>
+          </a:p>
+          <a:p>
+            <a:r>
+              <a:rPr lang="en-US" dirty="0"/>
+              <a:t>- While I was creating, I kept coming up with new ideas</a:t>
+            </a:r>
+          </a:p>
+          <a:p>
+            <a:pPr lvl="1"/>
+            <a:r>
+              <a:rPr lang="en-US" dirty="0"/>
+              <a:t>My creative process was different</a:t>
+            </a:r>
+          </a:p>
+          <a:p>
+            <a:r>
+              <a:rPr lang="en-US" dirty="0"/>
+              <a:t>- Ethics of using other’s work</a:t>
+            </a:r>
+          </a:p>
+        </p:txBody>
+      </p:sp>
+    </p:spTree>
+    <p:extLst>
+      <p:ext uri="{BB962C8B-B14F-4D97-AF65-F5344CB8AC3E}">
+        <p14:creationId xmlns:p14="http://schemas.microsoft.com/office/powerpoint/2010/main" val="4095183370"/>
+      </p:ext>
+    </p:extLst>
+  </p:cSld>
+  <p:clrMapOvr>
+    <a:masterClrMapping/>
+  </p:clrMapOvr>
+</p:sld>
+</file>
+
+<file path=ppt/slides/slide9.xml><?xml version="1.0" encoding="utf-8"?>
 <p:sld xmlns:a="http://schemas.openxmlformats.org/drawingml/2006/main" xmlns:r="http://schemas.openxmlformats.org/officeDocument/2006/relationships" xmlns:p="http://schemas.openxmlformats.org/presentationml/2006/main">
   <p:cSld>
     <p:bg>
@@ -6604,191 +6989,6 @@
   </p:cSld>
   <p:clrMapOvr>
     <a:overrideClrMapping bg1="dk1" tx1="lt1" bg2="dk2" tx2="lt2" accent1="accent1" accent2="accent2" accent3="accent3" accent4="accent4" accent5="accent5" accent6="accent6" hlink="hlink" folHlink="folHlink"/>
-  </p:clrMapOvr>
-</p:sld>
-</file>
-
-<file path=ppt/slides/slide8.xml><?xml version="1.0" encoding="utf-8"?>
-<p:sld xmlns:a="http://schemas.openxmlformats.org/drawingml/2006/main" xmlns:r="http://schemas.openxmlformats.org/officeDocument/2006/relationships" xmlns:p="http://schemas.openxmlformats.org/presentationml/2006/main">
-  <p:cSld>
-    <p:spTree>
-      <p:nvGrpSpPr>
-        <p:cNvPr id="1" name=""/>
-        <p:cNvGrpSpPr/>
-        <p:nvPr/>
-      </p:nvGrpSpPr>
-      <p:grpSpPr>
-        <a:xfrm>
-          <a:off x="0" y="0"/>
-          <a:ext cx="0" cy="0"/>
-          <a:chOff x="0" y="0"/>
-          <a:chExt cx="0" cy="0"/>
-        </a:xfrm>
-      </p:grpSpPr>
-      <p:sp>
-        <p:nvSpPr>
-          <p:cNvPr id="2" name="Title 1">
-            <a:extLst>
-              <a:ext uri="{FF2B5EF4-FFF2-40B4-BE49-F238E27FC236}">
-                <a16:creationId xmlns:a16="http://schemas.microsoft.com/office/drawing/2014/main" id="{44657CCC-1AFB-8D49-BF0C-6180BD6D3C5A}"/>
-              </a:ext>
-            </a:extLst>
-          </p:cNvPr>
-          <p:cNvSpPr>
-            <a:spLocks noGrp="1"/>
-          </p:cNvSpPr>
-          <p:nvPr>
-            <p:ph type="title"/>
-          </p:nvPr>
-        </p:nvSpPr>
-        <p:spPr>
-          <a:xfrm>
-            <a:off x="1097280" y="286603"/>
-            <a:ext cx="10058400" cy="1450757"/>
-          </a:xfrm>
-        </p:spPr>
-        <p:txBody>
-          <a:bodyPr/>
-          <a:lstStyle/>
-          <a:p>
-            <a:r>
-              <a:rPr lang="en-US" dirty="0"/>
-              <a:t>home</a:t>
-            </a:r>
-          </a:p>
-        </p:txBody>
-      </p:sp>
-      <p:pic>
-        <p:nvPicPr>
-          <p:cNvPr id="5" name="Content Placeholder 4" descr="A picture containing outdoor, mountain, water, white&#10;&#10;Description automatically generated">
-            <a:extLst>
-              <a:ext uri="{FF2B5EF4-FFF2-40B4-BE49-F238E27FC236}">
-                <a16:creationId xmlns:a16="http://schemas.microsoft.com/office/drawing/2014/main" id="{06C50B92-5E3B-C942-83E3-89CEED2E3141}"/>
-              </a:ext>
-            </a:extLst>
-          </p:cNvPr>
-          <p:cNvPicPr>
-            <a:picLocks noGrp="1" noChangeAspect="1"/>
-          </p:cNvPicPr>
-          <p:nvPr>
-            <p:ph idx="1"/>
-          </p:nvPr>
-        </p:nvPicPr>
-        <p:blipFill>
-          <a:blip r:embed="rId2"/>
-          <a:stretch>
-            <a:fillRect/>
-          </a:stretch>
-        </p:blipFill>
-        <p:spPr>
-          <a:xfrm>
-            <a:off x="3117533" y="2108200"/>
-            <a:ext cx="6017260" cy="3760788"/>
-          </a:xfrm>
-        </p:spPr>
-      </p:pic>
-    </p:spTree>
-    <p:extLst>
-      <p:ext uri="{BB962C8B-B14F-4D97-AF65-F5344CB8AC3E}">
-        <p14:creationId xmlns:p14="http://schemas.microsoft.com/office/powerpoint/2010/main" val="3845786955"/>
-      </p:ext>
-    </p:extLst>
-  </p:cSld>
-  <p:clrMapOvr>
-    <a:masterClrMapping/>
-  </p:clrMapOvr>
-</p:sld>
-</file>
-
-<file path=ppt/slides/slide9.xml><?xml version="1.0" encoding="utf-8"?>
-<p:sld xmlns:a="http://schemas.openxmlformats.org/drawingml/2006/main" xmlns:r="http://schemas.openxmlformats.org/officeDocument/2006/relationships" xmlns:p="http://schemas.openxmlformats.org/presentationml/2006/main">
-  <p:cSld>
-    <p:spTree>
-      <p:nvGrpSpPr>
-        <p:cNvPr id="1" name=""/>
-        <p:cNvGrpSpPr/>
-        <p:nvPr/>
-      </p:nvGrpSpPr>
-      <p:grpSpPr>
-        <a:xfrm>
-          <a:off x="0" y="0"/>
-          <a:ext cx="0" cy="0"/>
-          <a:chOff x="0" y="0"/>
-          <a:chExt cx="0" cy="0"/>
-        </a:xfrm>
-      </p:grpSpPr>
-      <p:sp>
-        <p:nvSpPr>
-          <p:cNvPr id="2" name="Title 1">
-            <a:extLst>
-              <a:ext uri="{FF2B5EF4-FFF2-40B4-BE49-F238E27FC236}">
-                <a16:creationId xmlns:a16="http://schemas.microsoft.com/office/drawing/2014/main" id="{950E2EC4-C3AE-6948-A55D-39B416759492}"/>
-              </a:ext>
-            </a:extLst>
-          </p:cNvPr>
-          <p:cNvSpPr>
-            <a:spLocks noGrp="1"/>
-          </p:cNvSpPr>
-          <p:nvPr>
-            <p:ph type="title"/>
-          </p:nvPr>
-        </p:nvSpPr>
-        <p:spPr>
-          <a:xfrm>
-            <a:off x="1097280" y="286603"/>
-            <a:ext cx="10058400" cy="1450757"/>
-          </a:xfrm>
-        </p:spPr>
-        <p:txBody>
-          <a:bodyPr/>
-          <a:lstStyle/>
-          <a:p>
-            <a:r>
-              <a:rPr lang="en-US"/>
-              <a:t>blog</a:t>
-            </a:r>
-            <a:endParaRPr lang="en-US" dirty="0"/>
-          </a:p>
-        </p:txBody>
-      </p:sp>
-      <p:pic>
-        <p:nvPicPr>
-          <p:cNvPr id="5" name="Content Placeholder 4" descr="A screenshot of a cell phone&#10;&#10;Description automatically generated">
-            <a:extLst>
-              <a:ext uri="{FF2B5EF4-FFF2-40B4-BE49-F238E27FC236}">
-                <a16:creationId xmlns:a16="http://schemas.microsoft.com/office/drawing/2014/main" id="{75DF87F3-6BB1-5344-B0C3-643D6E374275}"/>
-              </a:ext>
-            </a:extLst>
-          </p:cNvPr>
-          <p:cNvPicPr>
-            <a:picLocks noGrp="1" noChangeAspect="1"/>
-          </p:cNvPicPr>
-          <p:nvPr>
-            <p:ph idx="1"/>
-          </p:nvPr>
-        </p:nvPicPr>
-        <p:blipFill>
-          <a:blip r:embed="rId2"/>
-          <a:stretch>
-            <a:fillRect/>
-          </a:stretch>
-        </p:blipFill>
-        <p:spPr>
-          <a:xfrm>
-            <a:off x="3117533" y="2108200"/>
-            <a:ext cx="6017260" cy="3760788"/>
-          </a:xfrm>
-        </p:spPr>
-      </p:pic>
-    </p:spTree>
-    <p:extLst>
-      <p:ext uri="{BB962C8B-B14F-4D97-AF65-F5344CB8AC3E}">
-        <p14:creationId xmlns:p14="http://schemas.microsoft.com/office/powerpoint/2010/main" val="123422405"/>
-      </p:ext>
-    </p:extLst>
-  </p:cSld>
-  <p:clrMapOvr>
-    <a:masterClrMapping/>
   </p:clrMapOvr>
 </p:sld>
 </file>

</xml_diff>